<commit_message>
updated ef bonus slides
</commit_message>
<xml_diff>
--- a/linq/slides/11_EFBonus.pptx
+++ b/linq/slides/11_EFBonus.pptx
@@ -5,10 +5,10 @@
     <p:sldMasterId id="2147483772" r:id="rId1"/>
   </p:sldMasterIdLst>
   <p:notesMasterIdLst>
-    <p:notesMasterId r:id="rId14"/>
+    <p:notesMasterId r:id="rId13"/>
   </p:notesMasterIdLst>
   <p:handoutMasterIdLst>
-    <p:handoutMasterId r:id="rId15"/>
+    <p:handoutMasterId r:id="rId14"/>
   </p:handoutMasterIdLst>
   <p:sldIdLst>
     <p:sldId id="327" r:id="rId2"/>
@@ -17,12 +17,11 @@
     <p:sldId id="333" r:id="rId5"/>
     <p:sldId id="335" r:id="rId6"/>
     <p:sldId id="336" r:id="rId7"/>
-    <p:sldId id="338" r:id="rId8"/>
-    <p:sldId id="331" r:id="rId9"/>
-    <p:sldId id="337" r:id="rId10"/>
-    <p:sldId id="330" r:id="rId11"/>
-    <p:sldId id="334" r:id="rId12"/>
-    <p:sldId id="329" r:id="rId13"/>
+    <p:sldId id="331" r:id="rId8"/>
+    <p:sldId id="337" r:id="rId9"/>
+    <p:sldId id="330" r:id="rId10"/>
+    <p:sldId id="334" r:id="rId11"/>
+    <p:sldId id="329" r:id="rId12"/>
   </p:sldIdLst>
   <p:sldSz cx="9144000" cy="6858000" type="screen4x3"/>
   <p:notesSz cx="7302500" cy="9588500"/>
@@ -245,7 +244,7 @@
               <a:pPr>
                 <a:defRPr/>
               </a:pPr>
-              <a:t>10/11/2011</a:t>
+              <a:t>5/5/2012</a:t>
             </a:fld>
             <a:endParaRPr lang="en-US"/>
           </a:p>
@@ -2403,7 +2402,11 @@
             <a:pPr marL="0" indent="0" defTabSz="914400" eaLnBrk="1" hangingPunct="1"/>
             <a:r>
               <a:rPr lang="en-US" dirty="0" smtClean="0"/>
-              <a:t>Advanced EF Topics</a:t>
+              <a:t>Bonus </a:t>
+            </a:r>
+            <a:r>
+              <a:rPr lang="en-US" dirty="0" smtClean="0"/>
+              <a:t>EF Topics</a:t>
             </a:r>
           </a:p>
         </p:txBody>
@@ -2447,599 +2450,6 @@
 </file>
 
 <file path=ppt/slides/slide10.xml><?xml version="1.0" encoding="utf-8"?>
-<p:sld xmlns:a="http://schemas.openxmlformats.org/drawingml/2006/main" xmlns:r="http://schemas.openxmlformats.org/officeDocument/2006/relationships" xmlns:p="http://schemas.openxmlformats.org/presentationml/2006/main">
-  <p:cSld>
-    <p:spTree>
-      <p:nvGrpSpPr>
-        <p:cNvPr id="1" name=""/>
-        <p:cNvGrpSpPr/>
-        <p:nvPr/>
-      </p:nvGrpSpPr>
-      <p:grpSpPr>
-        <a:xfrm>
-          <a:off x="0" y="0"/>
-          <a:ext cx="0" cy="0"/>
-          <a:chOff x="0" y="0"/>
-          <a:chExt cx="0" cy="0"/>
-        </a:xfrm>
-      </p:grpSpPr>
-      <p:sp>
-        <p:nvSpPr>
-          <p:cNvPr id="2" name="Title 1"/>
-          <p:cNvSpPr>
-            <a:spLocks noGrp="1"/>
-          </p:cNvSpPr>
-          <p:nvPr>
-            <p:ph type="title"/>
-          </p:nvPr>
-        </p:nvSpPr>
-        <p:spPr/>
-        <p:txBody>
-          <a:bodyPr/>
-          <a:lstStyle/>
-          <a:p>
-            <a:r>
-              <a:rPr lang="en-US" dirty="0" smtClean="0"/>
-              <a:t>Migrations</a:t>
-            </a:r>
-            <a:endParaRPr lang="en-US" dirty="0"/>
-          </a:p>
-        </p:txBody>
-      </p:sp>
-      <p:sp>
-        <p:nvSpPr>
-          <p:cNvPr id="3" name="Text Placeholder 2"/>
-          <p:cNvSpPr>
-            <a:spLocks noGrp="1"/>
-          </p:cNvSpPr>
-          <p:nvPr>
-            <p:ph type="body" idx="1"/>
-          </p:nvPr>
-        </p:nvSpPr>
-        <p:spPr/>
-        <p:txBody>
-          <a:bodyPr/>
-          <a:lstStyle/>
-          <a:p>
-            <a:r>
-              <a:rPr lang="en-US" dirty="0" smtClean="0"/>
-              <a:t>Install-Package </a:t>
-            </a:r>
-            <a:r>
-              <a:rPr lang="en-US" dirty="0" err="1" smtClean="0"/>
-              <a:t>EntityFramwork.Migrations</a:t>
-            </a:r>
-            <a:endParaRPr lang="en-US" dirty="0" smtClean="0"/>
-          </a:p>
-          <a:p>
-            <a:pPr lvl="1"/>
-            <a:r>
-              <a:rPr lang="en-US" dirty="0" smtClean="0"/>
-              <a:t>Automatic migrations</a:t>
-            </a:r>
-          </a:p>
-          <a:p>
-            <a:pPr lvl="1"/>
-            <a:r>
-              <a:rPr lang="en-US" dirty="0" smtClean="0"/>
-              <a:t>Code based migrations</a:t>
-            </a:r>
-            <a:endParaRPr lang="en-US" dirty="0"/>
-          </a:p>
-        </p:txBody>
-      </p:sp>
-      <p:sp>
-        <p:nvSpPr>
-          <p:cNvPr id="4" name="Text Placeholder 2"/>
-          <p:cNvSpPr txBox="1">
-            <a:spLocks/>
-          </p:cNvSpPr>
-          <p:nvPr/>
-        </p:nvSpPr>
-        <p:spPr bwMode="auto">
-          <a:xfrm>
-            <a:off x="266700" y="2743200"/>
-            <a:ext cx="8534400" cy="2895600"/>
-          </a:xfrm>
-          <a:prstGeom prst="rect">
-            <a:avLst/>
-          </a:prstGeom>
-          <a:solidFill>
-            <a:schemeClr val="accent2"/>
-          </a:solidFill>
-          <a:ln w="9525">
-            <a:solidFill>
-              <a:schemeClr val="tx1"/>
-            </a:solidFill>
-            <a:miter lim="800000"/>
-            <a:headEnd/>
-            <a:tailEnd/>
-          </a:ln>
-        </p:spPr>
-        <p:txBody>
-          <a:bodyPr vert="horz" wrap="square" lIns="91440" tIns="45720" rIns="91440" bIns="45720" numCol="1" anchor="t" anchorCtr="0" compatLnSpc="1">
-            <a:prstTxWarp prst="textNoShape">
-              <a:avLst/>
-            </a:prstTxWarp>
-          </a:bodyPr>
-          <a:lstStyle/>
-          <a:p>
-            <a:pPr marL="342900" lvl="0" indent="-342900" algn="l" defTabSz="-13873163" eaLnBrk="1" hangingPunct="1">
-              <a:spcBef>
-                <a:spcPct val="20000"/>
-              </a:spcBef>
-              <a:defRPr/>
-            </a:pPr>
-            <a:r>
-              <a:rPr lang="en-US" b="0" dirty="0">
-                <a:solidFill>
-                  <a:srgbClr val="0000FF"/>
-                </a:solidFill>
-                <a:latin typeface="Consolas" pitchFamily="49" charset="0"/>
-                <a:cs typeface="Consolas" pitchFamily="49" charset="0"/>
-              </a:rPr>
-              <a:t>public</a:t>
-            </a:r>
-            <a:r>
-              <a:rPr lang="en-US" b="0" dirty="0">
-                <a:latin typeface="Consolas" pitchFamily="49" charset="0"/>
-                <a:cs typeface="Consolas" pitchFamily="49" charset="0"/>
-              </a:rPr>
-              <a:t> </a:t>
-            </a:r>
-            <a:r>
-              <a:rPr lang="en-US" b="0" dirty="0">
-                <a:solidFill>
-                  <a:srgbClr val="0000FF"/>
-                </a:solidFill>
-                <a:latin typeface="Consolas" pitchFamily="49" charset="0"/>
-                <a:cs typeface="Consolas" pitchFamily="49" charset="0"/>
-              </a:rPr>
-              <a:t>class</a:t>
-            </a:r>
-            <a:r>
-              <a:rPr lang="en-US" b="0" dirty="0">
-                <a:latin typeface="Consolas" pitchFamily="49" charset="0"/>
-                <a:cs typeface="Consolas" pitchFamily="49" charset="0"/>
-              </a:rPr>
-              <a:t> </a:t>
-            </a:r>
-            <a:r>
-              <a:rPr lang="en-US" b="0" dirty="0">
-                <a:solidFill>
-                  <a:srgbClr val="2B91AF"/>
-                </a:solidFill>
-                <a:latin typeface="Consolas" pitchFamily="49" charset="0"/>
-                <a:cs typeface="Consolas" pitchFamily="49" charset="0"/>
-              </a:rPr>
-              <a:t>Settings</a:t>
-            </a:r>
-            <a:r>
-              <a:rPr lang="en-US" b="0" dirty="0">
-                <a:latin typeface="Consolas" pitchFamily="49" charset="0"/>
-                <a:cs typeface="Consolas" pitchFamily="49" charset="0"/>
-              </a:rPr>
-              <a:t> : </a:t>
-            </a:r>
-            <a:r>
-              <a:rPr lang="en-US" b="0" dirty="0" err="1">
-                <a:solidFill>
-                  <a:srgbClr val="2B91AF"/>
-                </a:solidFill>
-                <a:latin typeface="Consolas" pitchFamily="49" charset="0"/>
-                <a:cs typeface="Consolas" pitchFamily="49" charset="0"/>
-              </a:rPr>
-              <a:t>DbMigrationContext</a:t>
-            </a:r>
-            <a:r>
-              <a:rPr lang="en-US" b="0" dirty="0">
-                <a:latin typeface="Consolas" pitchFamily="49" charset="0"/>
-                <a:cs typeface="Consolas" pitchFamily="49" charset="0"/>
-              </a:rPr>
-              <a:t>&lt;</a:t>
-            </a:r>
-            <a:r>
-              <a:rPr lang="en-US" b="0" dirty="0" err="1">
-                <a:solidFill>
-                  <a:srgbClr val="2B91AF"/>
-                </a:solidFill>
-                <a:latin typeface="Consolas" pitchFamily="49" charset="0"/>
-                <a:cs typeface="Consolas" pitchFamily="49" charset="0"/>
-              </a:rPr>
-              <a:t>MovieDb</a:t>
-            </a:r>
-            <a:r>
-              <a:rPr lang="en-US" b="0" dirty="0" smtClean="0">
-                <a:latin typeface="Consolas" pitchFamily="49" charset="0"/>
-                <a:cs typeface="Consolas" pitchFamily="49" charset="0"/>
-              </a:rPr>
-              <a:t>&gt;</a:t>
-            </a:r>
-          </a:p>
-          <a:p>
-            <a:pPr marL="342900" lvl="0" indent="-342900" algn="l" defTabSz="-13873163" eaLnBrk="1" hangingPunct="1">
-              <a:spcBef>
-                <a:spcPct val="20000"/>
-              </a:spcBef>
-              <a:defRPr/>
-            </a:pPr>
-            <a:r>
-              <a:rPr lang="en-US" b="0" dirty="0" smtClean="0">
-                <a:latin typeface="Consolas" pitchFamily="49" charset="0"/>
-                <a:cs typeface="Consolas" pitchFamily="49" charset="0"/>
-              </a:rPr>
-              <a:t>{</a:t>
-            </a:r>
-          </a:p>
-          <a:p>
-            <a:pPr marL="342900" lvl="0" indent="-342900" algn="l" defTabSz="-13873163" eaLnBrk="1" hangingPunct="1">
-              <a:spcBef>
-                <a:spcPct val="20000"/>
-              </a:spcBef>
-              <a:defRPr/>
-            </a:pPr>
-            <a:r>
-              <a:rPr lang="en-US" b="0" dirty="0" smtClean="0">
-                <a:solidFill>
-                  <a:srgbClr val="0000FF"/>
-                </a:solidFill>
-                <a:latin typeface="Consolas" pitchFamily="49" charset="0"/>
-                <a:cs typeface="Consolas" pitchFamily="49" charset="0"/>
-              </a:rPr>
-              <a:t>     public</a:t>
-            </a:r>
-            <a:r>
-              <a:rPr lang="en-US" b="0" dirty="0">
-                <a:latin typeface="Consolas" pitchFamily="49" charset="0"/>
-                <a:cs typeface="Consolas" pitchFamily="49" charset="0"/>
-              </a:rPr>
-              <a:t> Settings()     </a:t>
-            </a:r>
-            <a:endParaRPr lang="en-US" b="0" dirty="0" smtClean="0">
-              <a:latin typeface="Consolas" pitchFamily="49" charset="0"/>
-              <a:cs typeface="Consolas" pitchFamily="49" charset="0"/>
-            </a:endParaRPr>
-          </a:p>
-          <a:p>
-            <a:pPr marL="342900" lvl="0" indent="-342900" algn="l" defTabSz="-13873163" eaLnBrk="1" hangingPunct="1">
-              <a:spcBef>
-                <a:spcPct val="20000"/>
-              </a:spcBef>
-              <a:defRPr/>
-            </a:pPr>
-            <a:r>
-              <a:rPr lang="en-US" b="0" dirty="0">
-                <a:latin typeface="Consolas" pitchFamily="49" charset="0"/>
-                <a:cs typeface="Consolas" pitchFamily="49" charset="0"/>
-              </a:rPr>
-              <a:t> </a:t>
-            </a:r>
-            <a:r>
-              <a:rPr lang="en-US" b="0" dirty="0" smtClean="0">
-                <a:latin typeface="Consolas" pitchFamily="49" charset="0"/>
-                <a:cs typeface="Consolas" pitchFamily="49" charset="0"/>
-              </a:rPr>
-              <a:t>   { </a:t>
-            </a:r>
-            <a:r>
-              <a:rPr lang="en-US" b="0" dirty="0">
-                <a:latin typeface="Consolas" pitchFamily="49" charset="0"/>
-                <a:cs typeface="Consolas" pitchFamily="49" charset="0"/>
-              </a:rPr>
-              <a:t>        </a:t>
-            </a:r>
-            <a:endParaRPr lang="en-US" b="0" dirty="0" smtClean="0">
-              <a:latin typeface="Consolas" pitchFamily="49" charset="0"/>
-              <a:cs typeface="Consolas" pitchFamily="49" charset="0"/>
-            </a:endParaRPr>
-          </a:p>
-          <a:p>
-            <a:pPr marL="342900" lvl="0" indent="-342900" algn="l" defTabSz="-13873163" eaLnBrk="1" hangingPunct="1">
-              <a:spcBef>
-                <a:spcPct val="20000"/>
-              </a:spcBef>
-              <a:defRPr/>
-            </a:pPr>
-            <a:r>
-              <a:rPr lang="en-US" b="0" dirty="0">
-                <a:latin typeface="Consolas" pitchFamily="49" charset="0"/>
-                <a:cs typeface="Consolas" pitchFamily="49" charset="0"/>
-              </a:rPr>
-              <a:t> </a:t>
-            </a:r>
-            <a:r>
-              <a:rPr lang="en-US" b="0" dirty="0" smtClean="0">
-                <a:latin typeface="Consolas" pitchFamily="49" charset="0"/>
-                <a:cs typeface="Consolas" pitchFamily="49" charset="0"/>
-              </a:rPr>
-              <a:t>       </a:t>
-            </a:r>
-            <a:r>
-              <a:rPr lang="en-US" b="0" dirty="0" err="1" smtClean="0">
-                <a:latin typeface="Consolas" pitchFamily="49" charset="0"/>
-                <a:cs typeface="Consolas" pitchFamily="49" charset="0"/>
-              </a:rPr>
-              <a:t>AutomaticMigrationsEnabled</a:t>
-            </a:r>
-            <a:r>
-              <a:rPr lang="en-US" b="0" dirty="0">
-                <a:latin typeface="Consolas" pitchFamily="49" charset="0"/>
-                <a:cs typeface="Consolas" pitchFamily="49" charset="0"/>
-              </a:rPr>
-              <a:t> = </a:t>
-            </a:r>
-            <a:r>
-              <a:rPr lang="en-US" b="0" dirty="0">
-                <a:solidFill>
-                  <a:srgbClr val="0000FF"/>
-                </a:solidFill>
-                <a:latin typeface="Consolas" pitchFamily="49" charset="0"/>
-                <a:cs typeface="Consolas" pitchFamily="49" charset="0"/>
-              </a:rPr>
-              <a:t>false</a:t>
-            </a:r>
-            <a:r>
-              <a:rPr lang="en-US" b="0" dirty="0" smtClean="0">
-                <a:latin typeface="Consolas" pitchFamily="49" charset="0"/>
-                <a:cs typeface="Consolas" pitchFamily="49" charset="0"/>
-              </a:rPr>
-              <a:t>;</a:t>
-            </a:r>
-          </a:p>
-          <a:p>
-            <a:pPr marL="342900" lvl="0" indent="-342900" algn="l" defTabSz="-13873163" eaLnBrk="1" hangingPunct="1">
-              <a:spcBef>
-                <a:spcPct val="20000"/>
-              </a:spcBef>
-              <a:defRPr/>
-            </a:pPr>
-            <a:r>
-              <a:rPr lang="en-US" b="0" dirty="0">
-                <a:latin typeface="Consolas" pitchFamily="49" charset="0"/>
-                <a:cs typeface="Consolas" pitchFamily="49" charset="0"/>
-              </a:rPr>
-              <a:t>        </a:t>
-            </a:r>
-            <a:r>
-              <a:rPr lang="en-US" b="0" dirty="0" err="1">
-                <a:latin typeface="Consolas" pitchFamily="49" charset="0"/>
-                <a:cs typeface="Consolas" pitchFamily="49" charset="0"/>
-              </a:rPr>
-              <a:t>SetCodeGenerator</a:t>
-            </a:r>
-            <a:r>
-              <a:rPr lang="en-US" b="0" dirty="0">
-                <a:latin typeface="Consolas" pitchFamily="49" charset="0"/>
-                <a:cs typeface="Consolas" pitchFamily="49" charset="0"/>
-              </a:rPr>
-              <a:t>&lt;</a:t>
-            </a:r>
-            <a:r>
-              <a:rPr lang="en-US" b="0" dirty="0" err="1">
-                <a:solidFill>
-                  <a:srgbClr val="2B91AF"/>
-                </a:solidFill>
-                <a:latin typeface="Consolas" pitchFamily="49" charset="0"/>
-                <a:cs typeface="Consolas" pitchFamily="49" charset="0"/>
-              </a:rPr>
-              <a:t>CSharpMigrationCodeGenerator</a:t>
-            </a:r>
-            <a:r>
-              <a:rPr lang="en-US" b="0" dirty="0" smtClean="0">
-                <a:latin typeface="Consolas" pitchFamily="49" charset="0"/>
-                <a:cs typeface="Consolas" pitchFamily="49" charset="0"/>
-              </a:rPr>
-              <a:t>&gt;();</a:t>
-            </a:r>
-          </a:p>
-          <a:p>
-            <a:pPr marL="342900" lvl="0" indent="-342900" algn="l" defTabSz="-13873163" eaLnBrk="1" hangingPunct="1">
-              <a:spcBef>
-                <a:spcPct val="20000"/>
-              </a:spcBef>
-              <a:defRPr/>
-            </a:pPr>
-            <a:r>
-              <a:rPr lang="en-US" b="0" dirty="0">
-                <a:latin typeface="Consolas" pitchFamily="49" charset="0"/>
-                <a:cs typeface="Consolas" pitchFamily="49" charset="0"/>
-              </a:rPr>
-              <a:t>        </a:t>
-            </a:r>
-            <a:r>
-              <a:rPr lang="en-US" b="0" dirty="0" err="1">
-                <a:latin typeface="Consolas" pitchFamily="49" charset="0"/>
-                <a:cs typeface="Consolas" pitchFamily="49" charset="0"/>
-              </a:rPr>
-              <a:t>AddSqlGenerator</a:t>
-            </a:r>
-            <a:r>
-              <a:rPr lang="en-US" b="0" dirty="0">
-                <a:latin typeface="Consolas" pitchFamily="49" charset="0"/>
-                <a:cs typeface="Consolas" pitchFamily="49" charset="0"/>
-              </a:rPr>
-              <a:t>&lt;</a:t>
-            </a:r>
-            <a:r>
-              <a:rPr lang="en-US" b="0" dirty="0" err="1">
-                <a:solidFill>
-                  <a:srgbClr val="2B91AF"/>
-                </a:solidFill>
-                <a:latin typeface="Consolas" pitchFamily="49" charset="0"/>
-                <a:cs typeface="Consolas" pitchFamily="49" charset="0"/>
-              </a:rPr>
-              <a:t>SqlConnection</a:t>
-            </a:r>
-            <a:r>
-              <a:rPr lang="en-US" b="0" dirty="0">
-                <a:latin typeface="Consolas" pitchFamily="49" charset="0"/>
-                <a:cs typeface="Consolas" pitchFamily="49" charset="0"/>
-              </a:rPr>
-              <a:t>, </a:t>
-            </a:r>
-            <a:r>
-              <a:rPr lang="en-US" b="0" dirty="0" err="1">
-                <a:solidFill>
-                  <a:srgbClr val="2B91AF"/>
-                </a:solidFill>
-                <a:latin typeface="Consolas" pitchFamily="49" charset="0"/>
-                <a:cs typeface="Consolas" pitchFamily="49" charset="0"/>
-              </a:rPr>
-              <a:t>SqlServerMigrationSqlGenerator</a:t>
-            </a:r>
-            <a:r>
-              <a:rPr lang="en-US" b="0" dirty="0" smtClean="0">
-                <a:latin typeface="Consolas" pitchFamily="49" charset="0"/>
-                <a:cs typeface="Consolas" pitchFamily="49" charset="0"/>
-              </a:rPr>
-              <a:t>&gt;();</a:t>
-            </a:r>
-          </a:p>
-          <a:p>
-            <a:pPr marL="342900" lvl="0" indent="-342900" algn="l" defTabSz="-13873163" eaLnBrk="1" hangingPunct="1">
-              <a:spcBef>
-                <a:spcPct val="20000"/>
-              </a:spcBef>
-              <a:defRPr/>
-            </a:pPr>
-            <a:r>
-              <a:rPr lang="en-US" b="0" dirty="0" smtClean="0">
-                <a:latin typeface="Consolas" pitchFamily="49" charset="0"/>
-                <a:cs typeface="Consolas" pitchFamily="49" charset="0"/>
-              </a:rPr>
-              <a:t> </a:t>
-            </a:r>
-            <a:r>
-              <a:rPr lang="en-US" b="0" dirty="0">
-                <a:latin typeface="Consolas" pitchFamily="49" charset="0"/>
-                <a:cs typeface="Consolas" pitchFamily="49" charset="0"/>
-              </a:rPr>
-              <a:t>    } </a:t>
-            </a:r>
-            <a:endParaRPr lang="en-US" b="0" dirty="0" smtClean="0">
-              <a:latin typeface="Consolas" pitchFamily="49" charset="0"/>
-              <a:cs typeface="Consolas" pitchFamily="49" charset="0"/>
-            </a:endParaRPr>
-          </a:p>
-          <a:p>
-            <a:pPr marL="342900" lvl="0" indent="-342900" algn="l" defTabSz="-13873163" eaLnBrk="1" hangingPunct="1">
-              <a:spcBef>
-                <a:spcPct val="20000"/>
-              </a:spcBef>
-              <a:defRPr/>
-            </a:pPr>
-            <a:r>
-              <a:rPr lang="en-US" b="0" dirty="0" smtClean="0">
-                <a:latin typeface="Consolas" pitchFamily="49" charset="0"/>
-                <a:cs typeface="Consolas" pitchFamily="49" charset="0"/>
-              </a:rPr>
-              <a:t>} </a:t>
-            </a:r>
-            <a:endParaRPr lang="en-US" b="0" dirty="0">
-              <a:solidFill>
-                <a:srgbClr val="0000FF"/>
-              </a:solidFill>
-              <a:latin typeface="Consolas" pitchFamily="49" charset="0"/>
-              <a:cs typeface="Consolas" pitchFamily="49" charset="0"/>
-            </a:endParaRPr>
-          </a:p>
-        </p:txBody>
-      </p:sp>
-    </p:spTree>
-    <p:extLst>
-      <p:ext uri="{BB962C8B-B14F-4D97-AF65-F5344CB8AC3E}">
-        <p14:creationId xmlns:p14="http://schemas.microsoft.com/office/powerpoint/2010/main" val="407995209"/>
-      </p:ext>
-    </p:extLst>
-  </p:cSld>
-  <p:clrMapOvr>
-    <a:masterClrMapping/>
-  </p:clrMapOvr>
-  <p:transition>
-    <p:fade/>
-  </p:transition>
-  <p:timing>
-    <p:tnLst>
-      <p:par>
-        <p:cTn id="1" dur="indefinite" restart="never" nodeType="tmRoot">
-          <p:childTnLst>
-            <p:seq concurrent="1" nextAc="seek">
-              <p:cTn id="2" dur="indefinite" nodeType="mainSeq">
-                <p:childTnLst>
-                  <p:par>
-                    <p:cTn id="3" fill="hold">
-                      <p:stCondLst>
-                        <p:cond delay="indefinite"/>
-                      </p:stCondLst>
-                      <p:childTnLst>
-                        <p:par>
-                          <p:cTn id="4" fill="hold">
-                            <p:stCondLst>
-                              <p:cond delay="0"/>
-                            </p:stCondLst>
-                            <p:childTnLst>
-                              <p:par>
-                                <p:cTn id="5" presetID="1" presetClass="entr" presetSubtype="0" fill="hold" grpId="0" nodeType="clickEffect">
-                                  <p:stCondLst>
-                                    <p:cond delay="0"/>
-                                  </p:stCondLst>
-                                  <p:childTnLst>
-                                    <p:set>
-                                      <p:cBhvr>
-                                        <p:cTn id="6" dur="1" fill="hold">
-                                          <p:stCondLst>
-                                            <p:cond delay="0"/>
-                                          </p:stCondLst>
-                                        </p:cTn>
-                                        <p:tgtEl>
-                                          <p:spTgt spid="4"/>
-                                        </p:tgtEl>
-                                        <p:attrNameLst>
-                                          <p:attrName>style.visibility</p:attrName>
-                                        </p:attrNameLst>
-                                      </p:cBhvr>
-                                      <p:to>
-                                        <p:strVal val="visible"/>
-                                      </p:to>
-                                    </p:set>
-                                  </p:childTnLst>
-                                </p:cTn>
-                              </p:par>
-                            </p:childTnLst>
-                          </p:cTn>
-                        </p:par>
-                      </p:childTnLst>
-                    </p:cTn>
-                  </p:par>
-                </p:childTnLst>
-              </p:cTn>
-              <p:prevCondLst>
-                <p:cond evt="onPrev" delay="0">
-                  <p:tgtEl>
-                    <p:sldTgt/>
-                  </p:tgtEl>
-                </p:cond>
-              </p:prevCondLst>
-              <p:nextCondLst>
-                <p:cond evt="onNext" delay="0">
-                  <p:tgtEl>
-                    <p:sldTgt/>
-                  </p:tgtEl>
-                </p:cond>
-              </p:nextCondLst>
-            </p:seq>
-          </p:childTnLst>
-        </p:cTn>
-      </p:par>
-    </p:tnLst>
-    <p:bldLst>
-      <p:bldP spid="4" grpId="0" animBg="1"/>
-    </p:bldLst>
-  </p:timing>
-</p:sld>
-</file>
-
-<file path=ppt/slides/slide11.xml><?xml version="1.0" encoding="utf-8"?>
 <p:sld xmlns:a="http://schemas.openxmlformats.org/drawingml/2006/main" xmlns:r="http://schemas.openxmlformats.org/officeDocument/2006/relationships" xmlns:p="http://schemas.openxmlformats.org/presentationml/2006/main">
   <p:cSld>
     <p:spTree>
@@ -3182,7 +2592,7 @@
 </p:sld>
 </file>
 
-<file path=ppt/slides/slide12.xml><?xml version="1.0" encoding="utf-8"?>
+<file path=ppt/slides/slide11.xml><?xml version="1.0" encoding="utf-8"?>
 <p:sld xmlns:a="http://schemas.openxmlformats.org/drawingml/2006/main" xmlns:r="http://schemas.openxmlformats.org/officeDocument/2006/relationships" xmlns:p="http://schemas.openxmlformats.org/presentationml/2006/main">
   <p:cSld>
     <p:spTree>
@@ -4072,104 +3482,6 @@
           <a:p>
             <a:r>
               <a:rPr lang="en-US" dirty="0" smtClean="0"/>
-              <a:t>Other Entity Mappings</a:t>
-            </a:r>
-            <a:endParaRPr lang="en-US" dirty="0"/>
-          </a:p>
-        </p:txBody>
-      </p:sp>
-      <p:sp>
-        <p:nvSpPr>
-          <p:cNvPr id="3" name="Text Placeholder 2"/>
-          <p:cNvSpPr>
-            <a:spLocks noGrp="1"/>
-          </p:cNvSpPr>
-          <p:nvPr>
-            <p:ph type="body" idx="1"/>
-          </p:nvPr>
-        </p:nvSpPr>
-        <p:spPr/>
-        <p:txBody>
-          <a:bodyPr/>
-          <a:lstStyle/>
-          <a:p>
-            <a:r>
-              <a:rPr lang="en-US" dirty="0" smtClean="0"/>
-              <a:t>Entity splitting</a:t>
-            </a:r>
-          </a:p>
-          <a:p>
-            <a:r>
-              <a:rPr lang="en-US" dirty="0" smtClean="0"/>
-              <a:t>Complex Types</a:t>
-            </a:r>
-          </a:p>
-          <a:p>
-            <a:r>
-              <a:rPr lang="en-US" dirty="0" smtClean="0"/>
-              <a:t>Stored procedures with multiple </a:t>
-            </a:r>
-            <a:r>
-              <a:rPr lang="en-US" dirty="0" err="1" smtClean="0"/>
-              <a:t>resultsets</a:t>
-            </a:r>
-            <a:endParaRPr lang="en-US" dirty="0" smtClean="0"/>
-          </a:p>
-          <a:p>
-            <a:endParaRPr lang="en-US" dirty="0"/>
-          </a:p>
-        </p:txBody>
-      </p:sp>
-    </p:spTree>
-    <p:extLst>
-      <p:ext uri="{BB962C8B-B14F-4D97-AF65-F5344CB8AC3E}">
-        <p14:creationId xmlns:p14="http://schemas.microsoft.com/office/powerpoint/2010/main" val="3381710800"/>
-      </p:ext>
-    </p:extLst>
-  </p:cSld>
-  <p:clrMapOvr>
-    <a:masterClrMapping/>
-  </p:clrMapOvr>
-  <p:transition>
-    <p:fade/>
-  </p:transition>
-</p:sld>
-</file>
-
-<file path=ppt/slides/slide8.xml><?xml version="1.0" encoding="utf-8"?>
-<p:sld xmlns:a="http://schemas.openxmlformats.org/drawingml/2006/main" xmlns:r="http://schemas.openxmlformats.org/officeDocument/2006/relationships" xmlns:p="http://schemas.openxmlformats.org/presentationml/2006/main">
-  <p:cSld>
-    <p:spTree>
-      <p:nvGrpSpPr>
-        <p:cNvPr id="1" name=""/>
-        <p:cNvGrpSpPr/>
-        <p:nvPr/>
-      </p:nvGrpSpPr>
-      <p:grpSpPr>
-        <a:xfrm>
-          <a:off x="0" y="0"/>
-          <a:ext cx="0" cy="0"/>
-          <a:chOff x="0" y="0"/>
-          <a:chExt cx="0" cy="0"/>
-        </a:xfrm>
-      </p:grpSpPr>
-      <p:sp>
-        <p:nvSpPr>
-          <p:cNvPr id="2" name="Title 1"/>
-          <p:cNvSpPr>
-            <a:spLocks noGrp="1"/>
-          </p:cNvSpPr>
-          <p:nvPr>
-            <p:ph type="title"/>
-          </p:nvPr>
-        </p:nvSpPr>
-        <p:spPr/>
-        <p:txBody>
-          <a:bodyPr/>
-          <a:lstStyle/>
-          <a:p>
-            <a:r>
-              <a:rPr lang="en-US" dirty="0" smtClean="0"/>
               <a:t>Code Generation Items &amp; T4</a:t>
             </a:r>
             <a:endParaRPr lang="en-US" dirty="0"/>
@@ -4263,6 +3575,134 @@
 </p:sld>
 </file>
 
+<file path=ppt/slides/slide8.xml><?xml version="1.0" encoding="utf-8"?>
+<p:sld xmlns:a="http://schemas.openxmlformats.org/drawingml/2006/main" xmlns:r="http://schemas.openxmlformats.org/officeDocument/2006/relationships" xmlns:p="http://schemas.openxmlformats.org/presentationml/2006/main">
+  <p:cSld>
+    <p:spTree>
+      <p:nvGrpSpPr>
+        <p:cNvPr id="1" name=""/>
+        <p:cNvGrpSpPr/>
+        <p:nvPr/>
+      </p:nvGrpSpPr>
+      <p:grpSpPr>
+        <a:xfrm>
+          <a:off x="0" y="0"/>
+          <a:ext cx="0" cy="0"/>
+          <a:chOff x="0" y="0"/>
+          <a:chExt cx="0" cy="0"/>
+        </a:xfrm>
+      </p:grpSpPr>
+      <p:sp>
+        <p:nvSpPr>
+          <p:cNvPr id="2" name="Title 1"/>
+          <p:cNvSpPr>
+            <a:spLocks noGrp="1"/>
+          </p:cNvSpPr>
+          <p:nvPr>
+            <p:ph type="title"/>
+          </p:nvPr>
+        </p:nvSpPr>
+        <p:spPr/>
+        <p:txBody>
+          <a:bodyPr/>
+          <a:lstStyle/>
+          <a:p>
+            <a:r>
+              <a:rPr lang="en-US" dirty="0" smtClean="0"/>
+              <a:t>Validations</a:t>
+            </a:r>
+            <a:endParaRPr lang="en-US" dirty="0"/>
+          </a:p>
+        </p:txBody>
+      </p:sp>
+      <p:sp>
+        <p:nvSpPr>
+          <p:cNvPr id="3" name="Text Placeholder 2"/>
+          <p:cNvSpPr>
+            <a:spLocks noGrp="1"/>
+          </p:cNvSpPr>
+          <p:nvPr>
+            <p:ph type="body" idx="1"/>
+          </p:nvPr>
+        </p:nvSpPr>
+        <p:spPr/>
+        <p:txBody>
+          <a:bodyPr/>
+          <a:lstStyle/>
+          <a:p>
+            <a:r>
+              <a:rPr lang="en-US" dirty="0" err="1" smtClean="0"/>
+              <a:t>System.ComponentModel.DataAnnotations</a:t>
+            </a:r>
+            <a:endParaRPr lang="en-US" dirty="0" smtClean="0"/>
+          </a:p>
+          <a:p>
+            <a:pPr lvl="1"/>
+            <a:r>
+              <a:rPr lang="en-US" dirty="0" smtClean="0"/>
+              <a:t>Required</a:t>
+            </a:r>
+          </a:p>
+          <a:p>
+            <a:pPr lvl="1"/>
+            <a:r>
+              <a:rPr lang="en-US" dirty="0" err="1" smtClean="0"/>
+              <a:t>MinLength</a:t>
+            </a:r>
+            <a:endParaRPr lang="en-US" dirty="0" smtClean="0"/>
+          </a:p>
+          <a:p>
+            <a:pPr lvl="1"/>
+            <a:r>
+              <a:rPr lang="en-US" dirty="0" err="1" smtClean="0"/>
+              <a:t>MaxLength</a:t>
+            </a:r>
+            <a:endParaRPr lang="en-US" dirty="0" smtClean="0"/>
+          </a:p>
+          <a:p>
+            <a:pPr lvl="1"/>
+            <a:r>
+              <a:rPr lang="en-US" dirty="0" smtClean="0"/>
+              <a:t>Regex</a:t>
+            </a:r>
+          </a:p>
+          <a:p>
+            <a:pPr lvl="1"/>
+            <a:r>
+              <a:rPr lang="en-US" dirty="0" smtClean="0"/>
+              <a:t>Custom / </a:t>
+            </a:r>
+            <a:r>
+              <a:rPr lang="en-US" dirty="0" err="1" smtClean="0"/>
+              <a:t>IValidatableObject</a:t>
+            </a:r>
+            <a:endParaRPr lang="en-US" dirty="0"/>
+          </a:p>
+        </p:txBody>
+      </p:sp>
+    </p:spTree>
+    <p:extLst>
+      <p:ext uri="{BB962C8B-B14F-4D97-AF65-F5344CB8AC3E}">
+        <p14:creationId xmlns:p14="http://schemas.microsoft.com/office/powerpoint/2010/main" val="2636029489"/>
+      </p:ext>
+    </p:extLst>
+  </p:cSld>
+  <p:clrMapOvr>
+    <a:masterClrMapping/>
+  </p:clrMapOvr>
+  <p:transition>
+    <p:fade/>
+  </p:transition>
+  <p:timing>
+    <p:tnLst>
+      <p:par>
+        <p:cTn id="1" dur="indefinite" restart="never" nodeType="tmRoot"/>
+      </p:par>
+    </p:tnLst>
+  </p:timing>
+</p:sld>
+</file>
+
 <file path=ppt/slides/slide9.xml><?xml version="1.0" encoding="utf-8"?>
 <p:sld xmlns:a="http://schemas.openxmlformats.org/drawingml/2006/main" xmlns:r="http://schemas.openxmlformats.org/officeDocument/2006/relationships" xmlns:p="http://schemas.openxmlformats.org/presentationml/2006/main">
   <p:cSld>
@@ -4297,7 +3737,7 @@
           <a:p>
             <a:r>
               <a:rPr lang="en-US" dirty="0" smtClean="0"/>
-              <a:t>Validations</a:t>
+              <a:t>Migrations</a:t>
             </a:r>
             <a:endParaRPr lang="en-US" dirty="0"/>
           </a:p>
@@ -4319,8 +3759,8 @@
           <a:lstStyle/>
           <a:p>
             <a:r>
-              <a:rPr lang="en-US" dirty="0" err="1" smtClean="0"/>
-              <a:t>System.ComponentModel.DataAnnotations</a:t>
+              <a:rPr lang="en-US" dirty="0" smtClean="0"/>
+              <a:t>Enable-Migrations</a:t>
             </a:r>
             <a:endParaRPr lang="en-US" dirty="0" smtClean="0"/>
           </a:p>
@@ -4328,46 +3768,440 @@
             <a:pPr lvl="1"/>
             <a:r>
               <a:rPr lang="en-US" dirty="0" smtClean="0"/>
-              <a:t>Required</a:t>
+              <a:t>Automatic migrations</a:t>
             </a:r>
           </a:p>
           <a:p>
             <a:pPr lvl="1"/>
             <a:r>
-              <a:rPr lang="en-US" dirty="0" err="1" smtClean="0"/>
-              <a:t>MinLength</a:t>
-            </a:r>
-            <a:endParaRPr lang="en-US" dirty="0" smtClean="0"/>
-          </a:p>
-          <a:p>
-            <a:pPr lvl="1"/>
-            <a:r>
-              <a:rPr lang="en-US" dirty="0" err="1" smtClean="0"/>
-              <a:t>MaxLength</a:t>
-            </a:r>
-            <a:endParaRPr lang="en-US" dirty="0" smtClean="0"/>
-          </a:p>
-          <a:p>
-            <a:pPr lvl="1"/>
-            <a:r>
               <a:rPr lang="en-US" dirty="0" smtClean="0"/>
-              <a:t>Regex</a:t>
-            </a:r>
-          </a:p>
-          <a:p>
-            <a:pPr lvl="1"/>
-            <a:r>
-              <a:rPr lang="en-US" dirty="0" smtClean="0"/>
-              <a:t>Custom</a:t>
+              <a:t>Code based migrations</a:t>
             </a:r>
             <a:endParaRPr lang="en-US" dirty="0"/>
+          </a:p>
+        </p:txBody>
+      </p:sp>
+      <p:sp>
+        <p:nvSpPr>
+          <p:cNvPr id="4" name="Text Placeholder 2"/>
+          <p:cNvSpPr txBox="1">
+            <a:spLocks/>
+          </p:cNvSpPr>
+          <p:nvPr/>
+        </p:nvSpPr>
+        <p:spPr bwMode="auto">
+          <a:xfrm>
+            <a:off x="266700" y="2743200"/>
+            <a:ext cx="8534400" cy="2895600"/>
+          </a:xfrm>
+          <a:prstGeom prst="rect">
+            <a:avLst/>
+          </a:prstGeom>
+          <a:solidFill>
+            <a:schemeClr val="accent2"/>
+          </a:solidFill>
+          <a:ln w="9525">
+            <a:solidFill>
+              <a:schemeClr val="tx1"/>
+            </a:solidFill>
+            <a:miter lim="800000"/>
+            <a:headEnd/>
+            <a:tailEnd/>
+          </a:ln>
+        </p:spPr>
+        <p:txBody>
+          <a:bodyPr vert="horz" wrap="square" lIns="91440" tIns="45720" rIns="91440" bIns="45720" numCol="1" anchor="t" anchorCtr="0" compatLnSpc="1">
+            <a:prstTxWarp prst="textNoShape">
+              <a:avLst/>
+            </a:prstTxWarp>
+          </a:bodyPr>
+          <a:lstStyle/>
+          <a:p>
+            <a:pPr marL="342900" lvl="0" indent="-342900" algn="l" defTabSz="-13873163" eaLnBrk="1" hangingPunct="1">
+              <a:spcBef>
+                <a:spcPct val="20000"/>
+              </a:spcBef>
+              <a:defRPr/>
+            </a:pPr>
+            <a:r>
+              <a:rPr lang="en-US" b="0" dirty="0">
+                <a:solidFill>
+                  <a:srgbClr val="0000FF"/>
+                </a:solidFill>
+                <a:latin typeface="Consolas" pitchFamily="49" charset="0"/>
+                <a:cs typeface="Consolas" pitchFamily="49" charset="0"/>
+              </a:rPr>
+              <a:t>public</a:t>
+            </a:r>
+            <a:r>
+              <a:rPr lang="en-US" b="0" dirty="0">
+                <a:latin typeface="Consolas" pitchFamily="49" charset="0"/>
+                <a:cs typeface="Consolas" pitchFamily="49" charset="0"/>
+              </a:rPr>
+              <a:t> </a:t>
+            </a:r>
+            <a:r>
+              <a:rPr lang="en-US" b="0" dirty="0">
+                <a:solidFill>
+                  <a:srgbClr val="0000FF"/>
+                </a:solidFill>
+                <a:latin typeface="Consolas" pitchFamily="49" charset="0"/>
+                <a:cs typeface="Consolas" pitchFamily="49" charset="0"/>
+              </a:rPr>
+              <a:t>class</a:t>
+            </a:r>
+            <a:r>
+              <a:rPr lang="en-US" b="0" dirty="0">
+                <a:latin typeface="Consolas" pitchFamily="49" charset="0"/>
+                <a:cs typeface="Consolas" pitchFamily="49" charset="0"/>
+              </a:rPr>
+              <a:t> </a:t>
+            </a:r>
+            <a:r>
+              <a:rPr lang="en-US" b="0" dirty="0">
+                <a:solidFill>
+                  <a:srgbClr val="2B91AF"/>
+                </a:solidFill>
+                <a:latin typeface="Consolas" pitchFamily="49" charset="0"/>
+                <a:cs typeface="Consolas" pitchFamily="49" charset="0"/>
+              </a:rPr>
+              <a:t>Settings</a:t>
+            </a:r>
+            <a:r>
+              <a:rPr lang="en-US" b="0" dirty="0">
+                <a:latin typeface="Consolas" pitchFamily="49" charset="0"/>
+                <a:cs typeface="Consolas" pitchFamily="49" charset="0"/>
+              </a:rPr>
+              <a:t> : </a:t>
+            </a:r>
+            <a:r>
+              <a:rPr lang="en-US" b="0" dirty="0" err="1">
+                <a:solidFill>
+                  <a:srgbClr val="2B91AF"/>
+                </a:solidFill>
+                <a:latin typeface="Consolas" pitchFamily="49" charset="0"/>
+                <a:cs typeface="Consolas" pitchFamily="49" charset="0"/>
+              </a:rPr>
+              <a:t>DbMigrationContext</a:t>
+            </a:r>
+            <a:r>
+              <a:rPr lang="en-US" b="0" dirty="0">
+                <a:latin typeface="Consolas" pitchFamily="49" charset="0"/>
+                <a:cs typeface="Consolas" pitchFamily="49" charset="0"/>
+              </a:rPr>
+              <a:t>&lt;</a:t>
+            </a:r>
+            <a:r>
+              <a:rPr lang="en-US" b="0" dirty="0" err="1">
+                <a:solidFill>
+                  <a:srgbClr val="2B91AF"/>
+                </a:solidFill>
+                <a:latin typeface="Consolas" pitchFamily="49" charset="0"/>
+                <a:cs typeface="Consolas" pitchFamily="49" charset="0"/>
+              </a:rPr>
+              <a:t>MovieDb</a:t>
+            </a:r>
+            <a:r>
+              <a:rPr lang="en-US" b="0" dirty="0" smtClean="0">
+                <a:latin typeface="Consolas" pitchFamily="49" charset="0"/>
+                <a:cs typeface="Consolas" pitchFamily="49" charset="0"/>
+              </a:rPr>
+              <a:t>&gt;</a:t>
+            </a:r>
+          </a:p>
+          <a:p>
+            <a:pPr marL="342900" lvl="0" indent="-342900" algn="l" defTabSz="-13873163" eaLnBrk="1" hangingPunct="1">
+              <a:spcBef>
+                <a:spcPct val="20000"/>
+              </a:spcBef>
+              <a:defRPr/>
+            </a:pPr>
+            <a:r>
+              <a:rPr lang="en-US" b="0" dirty="0" smtClean="0">
+                <a:latin typeface="Consolas" pitchFamily="49" charset="0"/>
+                <a:cs typeface="Consolas" pitchFamily="49" charset="0"/>
+              </a:rPr>
+              <a:t>{</a:t>
+            </a:r>
+          </a:p>
+          <a:p>
+            <a:pPr marL="342900" lvl="0" indent="-342900" algn="l" defTabSz="-13873163" eaLnBrk="1" hangingPunct="1">
+              <a:spcBef>
+                <a:spcPct val="20000"/>
+              </a:spcBef>
+              <a:defRPr/>
+            </a:pPr>
+            <a:r>
+              <a:rPr lang="en-US" b="0" dirty="0" smtClean="0">
+                <a:solidFill>
+                  <a:srgbClr val="0000FF"/>
+                </a:solidFill>
+                <a:latin typeface="Consolas" pitchFamily="49" charset="0"/>
+                <a:cs typeface="Consolas" pitchFamily="49" charset="0"/>
+              </a:rPr>
+              <a:t>     public</a:t>
+            </a:r>
+            <a:r>
+              <a:rPr lang="en-US" b="0" dirty="0">
+                <a:latin typeface="Consolas" pitchFamily="49" charset="0"/>
+                <a:cs typeface="Consolas" pitchFamily="49" charset="0"/>
+              </a:rPr>
+              <a:t> Settings()     </a:t>
+            </a:r>
+            <a:endParaRPr lang="en-US" b="0" dirty="0" smtClean="0">
+              <a:latin typeface="Consolas" pitchFamily="49" charset="0"/>
+              <a:cs typeface="Consolas" pitchFamily="49" charset="0"/>
+            </a:endParaRPr>
+          </a:p>
+          <a:p>
+            <a:pPr marL="342900" lvl="0" indent="-342900" algn="l" defTabSz="-13873163" eaLnBrk="1" hangingPunct="1">
+              <a:spcBef>
+                <a:spcPct val="20000"/>
+              </a:spcBef>
+              <a:defRPr/>
+            </a:pPr>
+            <a:r>
+              <a:rPr lang="en-US" b="0" dirty="0">
+                <a:latin typeface="Consolas" pitchFamily="49" charset="0"/>
+                <a:cs typeface="Consolas" pitchFamily="49" charset="0"/>
+              </a:rPr>
+              <a:t> </a:t>
+            </a:r>
+            <a:r>
+              <a:rPr lang="en-US" b="0" dirty="0" smtClean="0">
+                <a:latin typeface="Consolas" pitchFamily="49" charset="0"/>
+                <a:cs typeface="Consolas" pitchFamily="49" charset="0"/>
+              </a:rPr>
+              <a:t>   { </a:t>
+            </a:r>
+            <a:r>
+              <a:rPr lang="en-US" b="0" dirty="0">
+                <a:latin typeface="Consolas" pitchFamily="49" charset="0"/>
+                <a:cs typeface="Consolas" pitchFamily="49" charset="0"/>
+              </a:rPr>
+              <a:t>        </a:t>
+            </a:r>
+            <a:endParaRPr lang="en-US" b="0" dirty="0" smtClean="0">
+              <a:latin typeface="Consolas" pitchFamily="49" charset="0"/>
+              <a:cs typeface="Consolas" pitchFamily="49" charset="0"/>
+            </a:endParaRPr>
+          </a:p>
+          <a:p>
+            <a:pPr marL="342900" lvl="0" indent="-342900" algn="l" defTabSz="-13873163" eaLnBrk="1" hangingPunct="1">
+              <a:spcBef>
+                <a:spcPct val="20000"/>
+              </a:spcBef>
+              <a:defRPr/>
+            </a:pPr>
+            <a:r>
+              <a:rPr lang="en-US" b="0" dirty="0">
+                <a:latin typeface="Consolas" pitchFamily="49" charset="0"/>
+                <a:cs typeface="Consolas" pitchFamily="49" charset="0"/>
+              </a:rPr>
+              <a:t> </a:t>
+            </a:r>
+            <a:r>
+              <a:rPr lang="en-US" b="0" dirty="0" smtClean="0">
+                <a:latin typeface="Consolas" pitchFamily="49" charset="0"/>
+                <a:cs typeface="Consolas" pitchFamily="49" charset="0"/>
+              </a:rPr>
+              <a:t>       </a:t>
+            </a:r>
+            <a:r>
+              <a:rPr lang="en-US" b="0" dirty="0" err="1" smtClean="0">
+                <a:latin typeface="Consolas" pitchFamily="49" charset="0"/>
+                <a:cs typeface="Consolas" pitchFamily="49" charset="0"/>
+              </a:rPr>
+              <a:t>AutomaticMigrationsEnabled</a:t>
+            </a:r>
+            <a:r>
+              <a:rPr lang="en-US" b="0" dirty="0">
+                <a:latin typeface="Consolas" pitchFamily="49" charset="0"/>
+                <a:cs typeface="Consolas" pitchFamily="49" charset="0"/>
+              </a:rPr>
+              <a:t> = </a:t>
+            </a:r>
+            <a:r>
+              <a:rPr lang="en-US" b="0" dirty="0">
+                <a:solidFill>
+                  <a:srgbClr val="0000FF"/>
+                </a:solidFill>
+                <a:latin typeface="Consolas" pitchFamily="49" charset="0"/>
+                <a:cs typeface="Consolas" pitchFamily="49" charset="0"/>
+              </a:rPr>
+              <a:t>false</a:t>
+            </a:r>
+            <a:r>
+              <a:rPr lang="en-US" b="0" dirty="0" smtClean="0">
+                <a:latin typeface="Consolas" pitchFamily="49" charset="0"/>
+                <a:cs typeface="Consolas" pitchFamily="49" charset="0"/>
+              </a:rPr>
+              <a:t>;</a:t>
+            </a:r>
+          </a:p>
+          <a:p>
+            <a:pPr marL="342900" lvl="0" indent="-342900" algn="l" defTabSz="-13873163" eaLnBrk="1" hangingPunct="1">
+              <a:spcBef>
+                <a:spcPct val="20000"/>
+              </a:spcBef>
+              <a:defRPr/>
+            </a:pPr>
+            <a:r>
+              <a:rPr lang="en-US" b="0" dirty="0">
+                <a:latin typeface="Consolas" pitchFamily="49" charset="0"/>
+                <a:cs typeface="Consolas" pitchFamily="49" charset="0"/>
+              </a:rPr>
+              <a:t>        </a:t>
+            </a:r>
+            <a:r>
+              <a:rPr lang="en-US" b="0" dirty="0" err="1">
+                <a:latin typeface="Consolas" pitchFamily="49" charset="0"/>
+                <a:cs typeface="Consolas" pitchFamily="49" charset="0"/>
+              </a:rPr>
+              <a:t>SetCodeGenerator</a:t>
+            </a:r>
+            <a:r>
+              <a:rPr lang="en-US" b="0" dirty="0">
+                <a:latin typeface="Consolas" pitchFamily="49" charset="0"/>
+                <a:cs typeface="Consolas" pitchFamily="49" charset="0"/>
+              </a:rPr>
+              <a:t>&lt;</a:t>
+            </a:r>
+            <a:r>
+              <a:rPr lang="en-US" b="0" dirty="0" err="1">
+                <a:solidFill>
+                  <a:srgbClr val="2B91AF"/>
+                </a:solidFill>
+                <a:latin typeface="Consolas" pitchFamily="49" charset="0"/>
+                <a:cs typeface="Consolas" pitchFamily="49" charset="0"/>
+              </a:rPr>
+              <a:t>CSharpMigrationCodeGenerator</a:t>
+            </a:r>
+            <a:r>
+              <a:rPr lang="en-US" b="0" dirty="0" smtClean="0">
+                <a:latin typeface="Consolas" pitchFamily="49" charset="0"/>
+                <a:cs typeface="Consolas" pitchFamily="49" charset="0"/>
+              </a:rPr>
+              <a:t>&gt;();</a:t>
+            </a:r>
+          </a:p>
+          <a:p>
+            <a:pPr marL="342900" lvl="0" indent="-342900" algn="l" defTabSz="-13873163" eaLnBrk="1" hangingPunct="1">
+              <a:spcBef>
+                <a:spcPct val="20000"/>
+              </a:spcBef>
+              <a:defRPr/>
+            </a:pPr>
+            <a:r>
+              <a:rPr lang="en-US" b="0" dirty="0">
+                <a:latin typeface="Consolas" pitchFamily="49" charset="0"/>
+                <a:cs typeface="Consolas" pitchFamily="49" charset="0"/>
+              </a:rPr>
+              <a:t>        </a:t>
+            </a:r>
+            <a:r>
+              <a:rPr lang="en-US" b="0" dirty="0" err="1">
+                <a:latin typeface="Consolas" pitchFamily="49" charset="0"/>
+                <a:cs typeface="Consolas" pitchFamily="49" charset="0"/>
+              </a:rPr>
+              <a:t>AddSqlGenerator</a:t>
+            </a:r>
+            <a:r>
+              <a:rPr lang="en-US" b="0" dirty="0">
+                <a:latin typeface="Consolas" pitchFamily="49" charset="0"/>
+                <a:cs typeface="Consolas" pitchFamily="49" charset="0"/>
+              </a:rPr>
+              <a:t>&lt;</a:t>
+            </a:r>
+            <a:r>
+              <a:rPr lang="en-US" b="0" dirty="0" err="1">
+                <a:solidFill>
+                  <a:srgbClr val="2B91AF"/>
+                </a:solidFill>
+                <a:latin typeface="Consolas" pitchFamily="49" charset="0"/>
+                <a:cs typeface="Consolas" pitchFamily="49" charset="0"/>
+              </a:rPr>
+              <a:t>SqlConnection</a:t>
+            </a:r>
+            <a:r>
+              <a:rPr lang="en-US" b="0" dirty="0">
+                <a:latin typeface="Consolas" pitchFamily="49" charset="0"/>
+                <a:cs typeface="Consolas" pitchFamily="49" charset="0"/>
+              </a:rPr>
+              <a:t>, </a:t>
+            </a:r>
+            <a:r>
+              <a:rPr lang="en-US" b="0" dirty="0" err="1">
+                <a:solidFill>
+                  <a:srgbClr val="2B91AF"/>
+                </a:solidFill>
+                <a:latin typeface="Consolas" pitchFamily="49" charset="0"/>
+                <a:cs typeface="Consolas" pitchFamily="49" charset="0"/>
+              </a:rPr>
+              <a:t>SqlServerMigrationSqlGenerator</a:t>
+            </a:r>
+            <a:r>
+              <a:rPr lang="en-US" b="0" dirty="0" smtClean="0">
+                <a:latin typeface="Consolas" pitchFamily="49" charset="0"/>
+                <a:cs typeface="Consolas" pitchFamily="49" charset="0"/>
+              </a:rPr>
+              <a:t>&gt;();</a:t>
+            </a:r>
+          </a:p>
+          <a:p>
+            <a:pPr marL="342900" lvl="0" indent="-342900" algn="l" defTabSz="-13873163" eaLnBrk="1" hangingPunct="1">
+              <a:spcBef>
+                <a:spcPct val="20000"/>
+              </a:spcBef>
+              <a:defRPr/>
+            </a:pPr>
+            <a:r>
+              <a:rPr lang="en-US" b="0" dirty="0" smtClean="0">
+                <a:latin typeface="Consolas" pitchFamily="49" charset="0"/>
+                <a:cs typeface="Consolas" pitchFamily="49" charset="0"/>
+              </a:rPr>
+              <a:t> </a:t>
+            </a:r>
+            <a:r>
+              <a:rPr lang="en-US" b="0" dirty="0">
+                <a:latin typeface="Consolas" pitchFamily="49" charset="0"/>
+                <a:cs typeface="Consolas" pitchFamily="49" charset="0"/>
+              </a:rPr>
+              <a:t>    } </a:t>
+            </a:r>
+            <a:endParaRPr lang="en-US" b="0" dirty="0" smtClean="0">
+              <a:latin typeface="Consolas" pitchFamily="49" charset="0"/>
+              <a:cs typeface="Consolas" pitchFamily="49" charset="0"/>
+            </a:endParaRPr>
+          </a:p>
+          <a:p>
+            <a:pPr marL="342900" lvl="0" indent="-342900" algn="l" defTabSz="-13873163" eaLnBrk="1" hangingPunct="1">
+              <a:spcBef>
+                <a:spcPct val="20000"/>
+              </a:spcBef>
+              <a:defRPr/>
+            </a:pPr>
+            <a:r>
+              <a:rPr lang="en-US" b="0" dirty="0" smtClean="0">
+                <a:latin typeface="Consolas" pitchFamily="49" charset="0"/>
+                <a:cs typeface="Consolas" pitchFamily="49" charset="0"/>
+              </a:rPr>
+              <a:t>} </a:t>
+            </a:r>
+            <a:endParaRPr lang="en-US" b="0" dirty="0">
+              <a:solidFill>
+                <a:srgbClr val="0000FF"/>
+              </a:solidFill>
+              <a:latin typeface="Consolas" pitchFamily="49" charset="0"/>
+              <a:cs typeface="Consolas" pitchFamily="49" charset="0"/>
+            </a:endParaRPr>
           </a:p>
         </p:txBody>
       </p:sp>
     </p:spTree>
     <p:extLst>
       <p:ext uri="{BB962C8B-B14F-4D97-AF65-F5344CB8AC3E}">
-        <p14:creationId xmlns:p14="http://schemas.microsoft.com/office/powerpoint/2010/main" val="2636029489"/>
+        <p14:creationId xmlns:p14="http://schemas.microsoft.com/office/powerpoint/2010/main" val="407995209"/>
       </p:ext>
     </p:extLst>
   </p:cSld>
@@ -4380,9 +4214,80 @@
   <p:timing>
     <p:tnLst>
       <p:par>
-        <p:cTn id="1" dur="indefinite" restart="never" nodeType="tmRoot"/>
+        <p:cTn id="1" dur="indefinite" restart="never" nodeType="tmRoot">
+          <p:childTnLst>
+            <p:seq concurrent="1" nextAc="seek">
+              <p:cTn id="2" dur="indefinite" nodeType="mainSeq">
+                <p:childTnLst>
+                  <p:par>
+                    <p:cTn id="3" fill="hold">
+                      <p:stCondLst>
+                        <p:cond delay="indefinite"/>
+                      </p:stCondLst>
+                      <p:childTnLst>
+                        <p:par>
+                          <p:cTn id="4" fill="hold">
+                            <p:stCondLst>
+                              <p:cond delay="0"/>
+                            </p:stCondLst>
+                            <p:childTnLst>
+                              <p:par>
+                                <p:cTn id="5" presetID="1" presetClass="entr" presetSubtype="0" fill="hold" grpId="0" nodeType="clickEffect">
+                                  <p:stCondLst>
+                                    <p:cond delay="0"/>
+                                  </p:stCondLst>
+                                  <p:childTnLst>
+                                    <p:set>
+                                      <p:cBhvr>
+                                        <p:cTn id="6" dur="1" fill="hold">
+                                          <p:stCondLst>
+                                            <p:cond delay="0"/>
+                                          </p:stCondLst>
+                                        </p:cTn>
+                                        <p:tgtEl>
+                                          <p:spTgt spid="4"/>
+                                        </p:tgtEl>
+                                        <p:attrNameLst>
+                                          <p:attrName>style.visibility</p:attrName>
+                                        </p:attrNameLst>
+                                      </p:cBhvr>
+                                      <p:to>
+                                        <p:strVal val="visible"/>
+                                      </p:to>
+                                    </p:set>
+                                  </p:childTnLst>
+                                </p:cTn>
+                              </p:par>
+                            </p:childTnLst>
+                          </p:cTn>
+                        </p:par>
+                      </p:childTnLst>
+                    </p:cTn>
+                  </p:par>
+                </p:childTnLst>
+              </p:cTn>
+              <p:prevCondLst>
+                <p:cond evt="onPrev" delay="0">
+                  <p:tgtEl>
+                    <p:sldTgt/>
+                  </p:tgtEl>
+                </p:cond>
+              </p:prevCondLst>
+              <p:nextCondLst>
+                <p:cond evt="onNext" delay="0">
+                  <p:tgtEl>
+                    <p:sldTgt/>
+                  </p:tgtEl>
+                </p:cond>
+              </p:nextCondLst>
+            </p:seq>
+          </p:childTnLst>
+        </p:cTn>
       </p:par>
     </p:tnLst>
+    <p:bldLst>
+      <p:bldP spid="4" grpId="0" animBg="1"/>
+    </p:bldLst>
   </p:timing>
 </p:sld>
 </file>

</xml_diff>